<commit_message>
Hands On Demos - Day 2.
</commit_message>
<xml_diff>
--- a/1. Core Java 8/Day 1/Slides/5. Looping and Arrays/looping-and-arrays-slides.pptx
+++ b/1. Core Java 8/Day 1/Slides/5. Looping and Arrays/looping-and-arrays-slides.pptx
@@ -3844,54 +3844,6 @@
               <a:cs typeface="Courier New" panose="02070309020205020404"/>
             </a:endParaRPr>
           </a:p>
-        </p:txBody>
-      </p:sp>
-      <p:sp>
-        <p:nvSpPr>
-          <p:cNvPr id="21" name="object 21"/>
-          <p:cNvSpPr/>
-          <p:nvPr/>
-        </p:nvSpPr>
-        <p:spPr>
-          <a:xfrm>
-            <a:off x="2796539" y="1117091"/>
-            <a:ext cx="2336800" cy="321945"/>
-          </a:xfrm>
-          <a:custGeom>
-            <a:avLst/>
-            <a:gdLst/>
-            <a:ahLst/>
-            <a:cxnLst/>
-            <a:rect l="l" t="t" r="r" b="b"/>
-            <a:pathLst>
-              <a:path w="2336800" h="321944">
-                <a:moveTo>
-                  <a:pt x="2336291" y="0"/>
-                </a:moveTo>
-                <a:lnTo>
-                  <a:pt x="0" y="0"/>
-                </a:lnTo>
-                <a:lnTo>
-                  <a:pt x="0" y="321563"/>
-                </a:lnTo>
-                <a:lnTo>
-                  <a:pt x="2336291" y="321563"/>
-                </a:lnTo>
-                <a:lnTo>
-                  <a:pt x="2336291" y="0"/>
-                </a:lnTo>
-                <a:close/>
-              </a:path>
-            </a:pathLst>
-          </a:custGeom>
-          <a:solidFill>
-            <a:srgbClr val="171717"/>
-          </a:solidFill>
-        </p:spPr>
-        <p:txBody>
-          <a:bodyPr wrap="square" lIns="0" tIns="0" rIns="0" bIns="0" rtlCol="0"/>
-          <a:lstStyle/>
-          <a:p/>
         </p:txBody>
       </p:sp>
       <p:sp>
@@ -14257,7 +14209,7 @@
         <p:spPr>
           <a:xfrm>
             <a:off x="362204" y="2718307"/>
-            <a:ext cx="2007235" cy="864869"/>
+            <a:ext cx="2007235" cy="859155"/>
           </a:xfrm>
           <a:prstGeom prst="rect">
             <a:avLst/>
@@ -14374,7 +14326,9 @@
             <a:r>
               <a:rPr sz="2000" spc="-65" dirty="0">
                 <a:solidFill>
-                  <a:srgbClr val="F1F1F1"/>
+                  <a:schemeClr val="bg1">
+                    <a:lumMod val="95000"/>
+                  </a:schemeClr>
                 </a:solidFill>
                 <a:latin typeface="Courier New" panose="02070309020205020404"/>
                 <a:cs typeface="Courier New" panose="02070309020205020404"/>
@@ -14382,16 +14336,22 @@
               <a:t> </a:t>
             </a:r>
             <a:r>
-              <a:rPr sz="2000" dirty="0">
-                <a:solidFill>
-                  <a:srgbClr val="F1F1F1"/>
+              <a:rPr lang="en-US" sz="2000" spc="-65" dirty="0">
+                <a:solidFill>
+                  <a:srgbClr val="FF0000"/>
                 </a:solidFill>
                 <a:latin typeface="Courier New" panose="02070309020205020404"/>
                 <a:cs typeface="Courier New" panose="02070309020205020404"/>
               </a:rPr>
               <a:t>{</a:t>
             </a:r>
-            <a:endParaRPr sz="2000">
+            <a:endParaRPr lang="en-US" sz="2000" spc="-65" dirty="0">
+              <a:solidFill>
+                <a:srgbClr val="FF0000"/>
+              </a:solidFill>
+              <a:highlight>
+                <a:srgbClr val="00FF00"/>
+              </a:highlight>
               <a:latin typeface="Courier New" panose="02070309020205020404"/>
               <a:cs typeface="Courier New" panose="02070309020205020404"/>
             </a:endParaRPr>
@@ -14407,7 +14367,7 @@
         <p:spPr>
           <a:xfrm>
             <a:off x="631698" y="3766565"/>
-            <a:ext cx="4323080" cy="2063750"/>
+            <a:ext cx="4323080" cy="2494280"/>
           </a:xfrm>
           <a:prstGeom prst="rect">
             <a:avLst/>
@@ -14637,7 +14597,51 @@
               </a:rPr>
               <a:t>);</a:t>
             </a:r>
-            <a:endParaRPr sz="2000">
+            <a:r>
+              <a:rPr lang="en-US" sz="2000" spc="-5" dirty="0">
+                <a:solidFill>
+                  <a:srgbClr val="F1F1F1"/>
+                </a:solidFill>
+                <a:latin typeface="Courier New" panose="02070309020205020404"/>
+                <a:cs typeface="Courier New" panose="02070309020205020404"/>
+              </a:rPr>
+              <a:t> </a:t>
+            </a:r>
+            <a:r>
+              <a:rPr lang="en-US" sz="2000" spc="-5" dirty="0">
+                <a:solidFill>
+                  <a:srgbClr val="FF0000"/>
+                </a:solidFill>
+                <a:latin typeface="Courier New" panose="02070309020205020404"/>
+                <a:cs typeface="Courier New" panose="02070309020205020404"/>
+              </a:rPr>
+              <a:t>}</a:t>
+            </a:r>
+            <a:endParaRPr sz="2000" spc="-5" dirty="0">
+              <a:solidFill>
+                <a:srgbClr val="F1F1F1"/>
+              </a:solidFill>
+              <a:latin typeface="Courier New" panose="02070309020205020404"/>
+              <a:cs typeface="Courier New" panose="02070309020205020404"/>
+            </a:endParaRPr>
+          </a:p>
+          <a:p>
+            <a:pPr marL="47625" marR="12065">
+              <a:lnSpc>
+                <a:spcPct val="100000"/>
+              </a:lnSpc>
+              <a:spcBef>
+                <a:spcPts val="1800"/>
+              </a:spcBef>
+            </a:pPr>
+            <a:r>
+              <a:rPr lang="en-US" sz="2000">
+                <a:latin typeface="Courier New" panose="02070309020205020404"/>
+                <a:cs typeface="Courier New" panose="02070309020205020404"/>
+              </a:rPr>
+              <a:t>}</a:t>
+            </a:r>
+            <a:endParaRPr lang="en-US" sz="2000">
               <a:latin typeface="Courier New" panose="02070309020205020404"/>
               <a:cs typeface="Courier New" panose="02070309020205020404"/>
             </a:endParaRPr>
@@ -15121,54 +15125,6 @@
           </a:custGeom>
           <a:solidFill>
             <a:srgbClr val="FFFFFF"/>
-          </a:solidFill>
-        </p:spPr>
-        <p:txBody>
-          <a:bodyPr wrap="square" lIns="0" tIns="0" rIns="0" bIns="0" rtlCol="0"/>
-          <a:lstStyle/>
-          <a:p/>
-        </p:txBody>
-      </p:sp>
-      <p:sp>
-        <p:nvSpPr>
-          <p:cNvPr id="21" name="object 21"/>
-          <p:cNvSpPr/>
-          <p:nvPr/>
-        </p:nvSpPr>
-        <p:spPr>
-          <a:xfrm>
-            <a:off x="758951" y="3285744"/>
-            <a:ext cx="401320" cy="327660"/>
-          </a:xfrm>
-          <a:custGeom>
-            <a:avLst/>
-            <a:gdLst/>
-            <a:ahLst/>
-            <a:cxnLst/>
-            <a:rect l="l" t="t" r="r" b="b"/>
-            <a:pathLst>
-              <a:path w="401319" h="327660">
-                <a:moveTo>
-                  <a:pt x="400811" y="0"/>
-                </a:moveTo>
-                <a:lnTo>
-                  <a:pt x="0" y="0"/>
-                </a:lnTo>
-                <a:lnTo>
-                  <a:pt x="0" y="327659"/>
-                </a:lnTo>
-                <a:lnTo>
-                  <a:pt x="400811" y="327659"/>
-                </a:lnTo>
-                <a:lnTo>
-                  <a:pt x="400811" y="0"/>
-                </a:lnTo>
-                <a:close/>
-              </a:path>
-            </a:pathLst>
-          </a:custGeom>
-          <a:solidFill>
-            <a:srgbClr val="171717"/>
           </a:solidFill>
         </p:spPr>
         <p:txBody>

</xml_diff>